<commit_message>
New V2.99 and Front End
</commit_message>
<xml_diff>
--- a/PPTs/Presentation1.pptx
+++ b/PPTs/Presentation1.pptx
@@ -272,7 +272,7 @@
           <a:p>
             <a:fld id="{E5269054-1563-4600-BC82-73B6AB852162}" type="datetimeFigureOut">
               <a:rPr lang="en-IN" smtClean="0"/>
-              <a:t>31-08-2024</a:t>
+              <a:t>29-09-2024</a:t>
             </a:fld>
             <a:endParaRPr lang="en-IN"/>
           </a:p>
@@ -488,7 +488,7 @@
           <a:p>
             <a:fld id="{E5269054-1563-4600-BC82-73B6AB852162}" type="datetimeFigureOut">
               <a:rPr lang="en-IN" smtClean="0"/>
-              <a:t>31-08-2024</a:t>
+              <a:t>29-09-2024</a:t>
             </a:fld>
             <a:endParaRPr lang="en-IN"/>
           </a:p>
@@ -698,7 +698,7 @@
           <a:p>
             <a:fld id="{E5269054-1563-4600-BC82-73B6AB852162}" type="datetimeFigureOut">
               <a:rPr lang="en-IN" smtClean="0"/>
-              <a:t>31-08-2024</a:t>
+              <a:t>29-09-2024</a:t>
             </a:fld>
             <a:endParaRPr lang="en-IN"/>
           </a:p>
@@ -898,7 +898,7 @@
           <a:p>
             <a:fld id="{E5269054-1563-4600-BC82-73B6AB852162}" type="datetimeFigureOut">
               <a:rPr lang="en-IN" smtClean="0"/>
-              <a:t>31-08-2024</a:t>
+              <a:t>29-09-2024</a:t>
             </a:fld>
             <a:endParaRPr lang="en-IN"/>
           </a:p>
@@ -1190,7 +1190,7 @@
           <a:p>
             <a:fld id="{E5269054-1563-4600-BC82-73B6AB852162}" type="datetimeFigureOut">
               <a:rPr lang="en-IN" smtClean="0"/>
-              <a:t>31-08-2024</a:t>
+              <a:t>29-09-2024</a:t>
             </a:fld>
             <a:endParaRPr lang="en-IN"/>
           </a:p>
@@ -1458,7 +1458,7 @@
           <a:p>
             <a:fld id="{E5269054-1563-4600-BC82-73B6AB852162}" type="datetimeFigureOut">
               <a:rPr lang="en-IN" smtClean="0"/>
-              <a:t>31-08-2024</a:t>
+              <a:t>29-09-2024</a:t>
             </a:fld>
             <a:endParaRPr lang="en-IN"/>
           </a:p>
@@ -1873,7 +1873,7 @@
           <a:p>
             <a:fld id="{E5269054-1563-4600-BC82-73B6AB852162}" type="datetimeFigureOut">
               <a:rPr lang="en-IN" smtClean="0"/>
-              <a:t>31-08-2024</a:t>
+              <a:t>29-09-2024</a:t>
             </a:fld>
             <a:endParaRPr lang="en-IN"/>
           </a:p>
@@ -2015,7 +2015,7 @@
           <a:p>
             <a:fld id="{E5269054-1563-4600-BC82-73B6AB852162}" type="datetimeFigureOut">
               <a:rPr lang="en-IN" smtClean="0"/>
-              <a:t>31-08-2024</a:t>
+              <a:t>29-09-2024</a:t>
             </a:fld>
             <a:endParaRPr lang="en-IN"/>
           </a:p>
@@ -2128,7 +2128,7 @@
           <a:p>
             <a:fld id="{E5269054-1563-4600-BC82-73B6AB852162}" type="datetimeFigureOut">
               <a:rPr lang="en-IN" smtClean="0"/>
-              <a:t>31-08-2024</a:t>
+              <a:t>29-09-2024</a:t>
             </a:fld>
             <a:endParaRPr lang="en-IN"/>
           </a:p>
@@ -2441,7 +2441,7 @@
           <a:p>
             <a:fld id="{E5269054-1563-4600-BC82-73B6AB852162}" type="datetimeFigureOut">
               <a:rPr lang="en-IN" smtClean="0"/>
-              <a:t>31-08-2024</a:t>
+              <a:t>29-09-2024</a:t>
             </a:fld>
             <a:endParaRPr lang="en-IN"/>
           </a:p>
@@ -2730,7 +2730,7 @@
           <a:p>
             <a:fld id="{E5269054-1563-4600-BC82-73B6AB852162}" type="datetimeFigureOut">
               <a:rPr lang="en-IN" smtClean="0"/>
-              <a:t>31-08-2024</a:t>
+              <a:t>29-09-2024</a:t>
             </a:fld>
             <a:endParaRPr lang="en-IN"/>
           </a:p>
@@ -2973,7 +2973,7 @@
           <a:p>
             <a:fld id="{E5269054-1563-4600-BC82-73B6AB852162}" type="datetimeFigureOut">
               <a:rPr lang="en-IN" smtClean="0"/>
-              <a:t>31-08-2024</a:t>
+              <a:t>29-09-2024</a:t>
             </a:fld>
             <a:endParaRPr lang="en-IN"/>
           </a:p>
@@ -6165,9 +6165,7 @@
             <a:r>
               <a:rPr lang="en-US" sz="4400" dirty="0">
                 <a:solidFill>
-                  <a:schemeClr val="accent6">
-                    <a:lumMod val="75000"/>
-                  </a:schemeClr>
+                  <a:srgbClr val="05C7F2"/>
                 </a:solidFill>
               </a:rPr>
               <a:t>Depression</a:t>

</xml_diff>